<commit_message>
Update bb part of powerpoint
</commit_message>
<xml_diff>
--- a/facilitator/terraform-workshop-intro.pptx
+++ b/facilitator/terraform-workshop-intro.pptx
@@ -331,7 +331,7 @@
             <a:fld id="{1D8BD707-D9CF-40AE-B4C6-C98DA3205C09}" type="datetimeFigureOut">
               <a:rPr lang="en-US" smtClean="0"/>
               <a:pPr/>
-              <a:t>1/25/21</a:t>
+              <a:t>4/28/21</a:t>
             </a:fld>
             <a:endParaRPr lang="en-US"/>
           </a:p>
@@ -496,7 +496,7 @@
             <a:fld id="{1D8BD707-D9CF-40AE-B4C6-C98DA3205C09}" type="datetimeFigureOut">
               <a:rPr lang="en-US" smtClean="0"/>
               <a:pPr/>
-              <a:t>1/25/21</a:t>
+              <a:t>4/28/21</a:t>
             </a:fld>
             <a:endParaRPr lang="en-US"/>
           </a:p>
@@ -671,7 +671,7 @@
             <a:fld id="{1D8BD707-D9CF-40AE-B4C6-C98DA3205C09}" type="datetimeFigureOut">
               <a:rPr lang="en-US" smtClean="0"/>
               <a:pPr/>
-              <a:t>1/25/21</a:t>
+              <a:t>4/28/21</a:t>
             </a:fld>
             <a:endParaRPr lang="en-US"/>
           </a:p>
@@ -836,7 +836,7 @@
             <a:fld id="{1D8BD707-D9CF-40AE-B4C6-C98DA3205C09}" type="datetimeFigureOut">
               <a:rPr lang="en-US" smtClean="0"/>
               <a:pPr/>
-              <a:t>1/25/21</a:t>
+              <a:t>4/28/21</a:t>
             </a:fld>
             <a:endParaRPr lang="en-US"/>
           </a:p>
@@ -1078,7 +1078,7 @@
             <a:fld id="{1D8BD707-D9CF-40AE-B4C6-C98DA3205C09}" type="datetimeFigureOut">
               <a:rPr lang="en-US" smtClean="0"/>
               <a:pPr/>
-              <a:t>1/25/21</a:t>
+              <a:t>4/28/21</a:t>
             </a:fld>
             <a:endParaRPr lang="en-US"/>
           </a:p>
@@ -1360,7 +1360,7 @@
             <a:fld id="{1D8BD707-D9CF-40AE-B4C6-C98DA3205C09}" type="datetimeFigureOut">
               <a:rPr lang="en-US" smtClean="0"/>
               <a:pPr/>
-              <a:t>1/25/21</a:t>
+              <a:t>4/28/21</a:t>
             </a:fld>
             <a:endParaRPr lang="en-US"/>
           </a:p>
@@ -1776,7 +1776,7 @@
             <a:fld id="{1D8BD707-D9CF-40AE-B4C6-C98DA3205C09}" type="datetimeFigureOut">
               <a:rPr lang="en-US" smtClean="0"/>
               <a:pPr/>
-              <a:t>1/25/21</a:t>
+              <a:t>4/28/21</a:t>
             </a:fld>
             <a:endParaRPr lang="en-US"/>
           </a:p>
@@ -1890,7 +1890,7 @@
             <a:fld id="{1D8BD707-D9CF-40AE-B4C6-C98DA3205C09}" type="datetimeFigureOut">
               <a:rPr lang="en-US" smtClean="0"/>
               <a:pPr/>
-              <a:t>1/25/21</a:t>
+              <a:t>4/28/21</a:t>
             </a:fld>
             <a:endParaRPr lang="en-US"/>
           </a:p>
@@ -1982,7 +1982,7 @@
             <a:fld id="{1D8BD707-D9CF-40AE-B4C6-C98DA3205C09}" type="datetimeFigureOut">
               <a:rPr lang="en-US" smtClean="0"/>
               <a:pPr/>
-              <a:t>1/25/21</a:t>
+              <a:t>4/28/21</a:t>
             </a:fld>
             <a:endParaRPr lang="en-US"/>
           </a:p>
@@ -2254,7 +2254,7 @@
             <a:fld id="{1D8BD707-D9CF-40AE-B4C6-C98DA3205C09}" type="datetimeFigureOut">
               <a:rPr lang="en-US" smtClean="0"/>
               <a:pPr/>
-              <a:t>1/25/21</a:t>
+              <a:t>4/28/21</a:t>
             </a:fld>
             <a:endParaRPr lang="en-US"/>
           </a:p>
@@ -2503,7 +2503,7 @@
             <a:fld id="{1D8BD707-D9CF-40AE-B4C6-C98DA3205C09}" type="datetimeFigureOut">
               <a:rPr lang="en-US" smtClean="0"/>
               <a:pPr/>
-              <a:t>1/25/21</a:t>
+              <a:t>4/28/21</a:t>
             </a:fld>
             <a:endParaRPr lang="en-US"/>
           </a:p>
@@ -2711,7 +2711,7 @@
             <a:fld id="{1D8BD707-D9CF-40AE-B4C6-C98DA3205C09}" type="datetimeFigureOut">
               <a:rPr lang="en-US" smtClean="0"/>
               <a:pPr/>
-              <a:t>1/25/21</a:t>
+              <a:t>4/28/21</a:t>
             </a:fld>
             <a:endParaRPr lang="en-US"/>
           </a:p>
@@ -4808,7 +4808,7 @@
               </a:lnSpc>
             </a:pPr>
             <a:r>
-              <a:rPr lang="en-US" sz="3200">
+              <a:rPr lang="en-US" sz="3200" dirty="0">
                 <a:solidFill>
                   <a:srgbClr val="1D2024"/>
                 </a:solidFill>
@@ -4824,14 +4824,29 @@
               </a:lnSpc>
             </a:pPr>
             <a:r>
-              <a:rPr lang="en-US" sz="3000">
+              <a:rPr lang="en-US" sz="3000" dirty="0">
                 <a:solidFill>
                   <a:srgbClr val="1D2024"/>
                 </a:solidFill>
                 <a:latin typeface="Raleway Bold"/>
               </a:rPr>
-              <a:t>Franca (she/her) - @francalovescake</a:t>
-            </a:r>
+              <a:t>Franca (she/her) - @</a:t>
+            </a:r>
+            <a:r>
+              <a:rPr lang="en-US" sz="3000" dirty="0" err="1">
+                <a:solidFill>
+                  <a:srgbClr val="1D2024"/>
+                </a:solidFill>
+                <a:latin typeface="Raleway Bold"/>
+              </a:rPr>
+              <a:t>francalovescake</a:t>
+            </a:r>
+            <a:endParaRPr lang="en-US" sz="3000" dirty="0">
+              <a:solidFill>
+                <a:srgbClr val="1D2024"/>
+              </a:solidFill>
+              <a:latin typeface="Raleway Bold"/>
+            </a:endParaRPr>
           </a:p>
           <a:p>
             <a:pPr algn="r">
@@ -4840,13 +4855,13 @@
               </a:lnSpc>
             </a:pPr>
             <a:r>
-              <a:rPr lang="en-US" sz="3000">
+              <a:rPr lang="en-US" sz="3000" dirty="0">
                 <a:solidFill>
                   <a:srgbClr val="1D2024"/>
                 </a:solidFill>
                 <a:latin typeface="Raleway Bold"/>
               </a:rPr>
-              <a:t>Bridget</a:t>
+              <a:t>Bridget (they/them)</a:t>
             </a:r>
           </a:p>
         </p:txBody>

</xml_diff>